<commit_message>
Submission - AI Deployment.pptx
</commit_message>
<xml_diff>
--- a/Submission - AI Deployment.pptx
+++ b/Submission - AI Deployment.pptx
@@ -5,13 +5,20 @@
     <p:sldMasterId id="2147483699" r:id="rId1"/>
   </p:sldMasterIdLst>
   <p:notesMasterIdLst>
-    <p:notesMasterId r:id="rId6"/>
+    <p:notesMasterId r:id="rId13"/>
   </p:notesMasterIdLst>
   <p:sldIdLst>
     <p:sldId id="258" r:id="rId2"/>
     <p:sldId id="259" r:id="rId3"/>
     <p:sldId id="260" r:id="rId4"/>
     <p:sldId id="262" r:id="rId5"/>
+    <p:sldId id="269" r:id="rId6"/>
+    <p:sldId id="263" r:id="rId7"/>
+    <p:sldId id="264" r:id="rId8"/>
+    <p:sldId id="265" r:id="rId9"/>
+    <p:sldId id="266" r:id="rId10"/>
+    <p:sldId id="267" r:id="rId11"/>
+    <p:sldId id="268" r:id="rId12"/>
   </p:sldIdLst>
   <p:sldSz cx="12192000" cy="6858000"/>
   <p:notesSz cx="6858000" cy="9144000"/>
@@ -121,12 +128,20 @@
 </p:presentation>
 </file>
 
+<file path=ppt/revisionInfo.xml><?xml version="1.0" encoding="utf-8"?>
+<p1510:revInfo xmlns:a="http://schemas.openxmlformats.org/drawingml/2006/main" xmlns:r="http://schemas.openxmlformats.org/officeDocument/2006/relationships" xmlns:p1510="http://schemas.microsoft.com/office/powerpoint/2015/10/main">
+  <p1510:revLst>
+    <p1510:client id="{E4812FB7-248D-4EA9-A727-1D8D0F5CA002}" v="1" dt="2025-05-30T18:08:01.534"/>
+  </p1510:revLst>
+</p1510:revInfo>
+</file>
+
 <file path=ppt/changesInfos/changesInfo1.xml><?xml version="1.0" encoding="utf-8"?>
 <pc:chgInfo xmlns:a="http://schemas.openxmlformats.org/drawingml/2006/main" xmlns:r="http://schemas.openxmlformats.org/officeDocument/2006/relationships" xmlns:ac="http://schemas.microsoft.com/office/drawing/2013/main/command" xmlns:pc="http://schemas.microsoft.com/office/powerpoint/2013/main/command">
   <pc:docChgLst>
     <pc:chgData name="Lua Irene" userId="985ce29fe78d48e8" providerId="LiveId" clId="{E4812FB7-248D-4EA9-A727-1D8D0F5CA002}"/>
-    <pc:docChg chg="undo custSel modSld">
-      <pc:chgData name="Lua Irene" userId="985ce29fe78d48e8" providerId="LiveId" clId="{E4812FB7-248D-4EA9-A727-1D8D0F5CA002}" dt="2025-05-30T17:06:27.787" v="17" actId="27636"/>
+    <pc:docChg chg="undo custSel addSld modSld">
+      <pc:chgData name="Lua Irene" userId="985ce29fe78d48e8" providerId="LiveId" clId="{E4812FB7-248D-4EA9-A727-1D8D0F5CA002}" dt="2025-05-30T18:19:27.652" v="275" actId="20577"/>
       <pc:docMkLst>
         <pc:docMk/>
       </pc:docMkLst>
@@ -203,6 +218,375 @@
             <pc:docMk/>
             <pc:sldMk cId="1495264617" sldId="262"/>
             <ac:spMk id="7" creationId="{05548931-BEED-6E28-676A-63E7CB86D11E}"/>
+          </ac:spMkLst>
+        </pc:spChg>
+      </pc:sldChg>
+      <pc:sldChg chg="addSp delSp modSp new mod modClrScheme chgLayout">
+        <pc:chgData name="Lua Irene" userId="985ce29fe78d48e8" providerId="LiveId" clId="{E4812FB7-248D-4EA9-A727-1D8D0F5CA002}" dt="2025-05-30T18:07:57.129" v="103" actId="20577"/>
+        <pc:sldMkLst>
+          <pc:docMk/>
+          <pc:sldMk cId="1571003302" sldId="263"/>
+        </pc:sldMkLst>
+        <pc:spChg chg="del mod ord">
+          <ac:chgData name="Lua Irene" userId="985ce29fe78d48e8" providerId="LiveId" clId="{E4812FB7-248D-4EA9-A727-1D8D0F5CA002}" dt="2025-05-30T18:05:47.102" v="19" actId="700"/>
+          <ac:spMkLst>
+            <pc:docMk/>
+            <pc:sldMk cId="1571003302" sldId="263"/>
+            <ac:spMk id="2" creationId="{DD9BB49E-9829-D588-FC0D-6C0B42C88DA3}"/>
+          </ac:spMkLst>
+        </pc:spChg>
+        <pc:spChg chg="del mod ord">
+          <ac:chgData name="Lua Irene" userId="985ce29fe78d48e8" providerId="LiveId" clId="{E4812FB7-248D-4EA9-A727-1D8D0F5CA002}" dt="2025-05-30T18:05:47.102" v="19" actId="700"/>
+          <ac:spMkLst>
+            <pc:docMk/>
+            <pc:sldMk cId="1571003302" sldId="263"/>
+            <ac:spMk id="3" creationId="{DD87AD3D-DAB9-AD51-3A60-28ADD28871A6}"/>
+          </ac:spMkLst>
+        </pc:spChg>
+        <pc:spChg chg="add mod ord">
+          <ac:chgData name="Lua Irene" userId="985ce29fe78d48e8" providerId="LiveId" clId="{E4812FB7-248D-4EA9-A727-1D8D0F5CA002}" dt="2025-05-30T18:07:57.129" v="103" actId="20577"/>
+          <ac:spMkLst>
+            <pc:docMk/>
+            <pc:sldMk cId="1571003302" sldId="263"/>
+            <ac:spMk id="4" creationId="{B63ED963-757E-9E14-46EB-D3958D20F906}"/>
+          </ac:spMkLst>
+        </pc:spChg>
+        <pc:spChg chg="add del mod ord">
+          <ac:chgData name="Lua Irene" userId="985ce29fe78d48e8" providerId="LiveId" clId="{E4812FB7-248D-4EA9-A727-1D8D0F5CA002}" dt="2025-05-30T18:06:12.501" v="20" actId="22"/>
+          <ac:spMkLst>
+            <pc:docMk/>
+            <pc:sldMk cId="1571003302" sldId="263"/>
+            <ac:spMk id="5" creationId="{15322256-377E-6209-DF6A-D967483A129B}"/>
+          </ac:spMkLst>
+        </pc:spChg>
+        <pc:spChg chg="add del mod ord">
+          <ac:chgData name="Lua Irene" userId="985ce29fe78d48e8" providerId="LiveId" clId="{E4812FB7-248D-4EA9-A727-1D8D0F5CA002}" dt="2025-05-30T18:06:36.382" v="21" actId="22"/>
+          <ac:spMkLst>
+            <pc:docMk/>
+            <pc:sldMk cId="1571003302" sldId="263"/>
+            <ac:spMk id="6" creationId="{FA052369-8F70-BF0B-EDC6-EFDDD955CB14}"/>
+          </ac:spMkLst>
+        </pc:spChg>
+        <pc:picChg chg="add mod ord">
+          <ac:chgData name="Lua Irene" userId="985ce29fe78d48e8" providerId="LiveId" clId="{E4812FB7-248D-4EA9-A727-1D8D0F5CA002}" dt="2025-05-30T18:06:12.501" v="20" actId="22"/>
+          <ac:picMkLst>
+            <pc:docMk/>
+            <pc:sldMk cId="1571003302" sldId="263"/>
+            <ac:picMk id="8" creationId="{2E5BBDD6-A28E-0AD7-2C90-EEB21B2D5206}"/>
+          </ac:picMkLst>
+        </pc:picChg>
+        <pc:picChg chg="add mod ord">
+          <ac:chgData name="Lua Irene" userId="985ce29fe78d48e8" providerId="LiveId" clId="{E4812FB7-248D-4EA9-A727-1D8D0F5CA002}" dt="2025-05-30T18:06:36.382" v="21" actId="22"/>
+          <ac:picMkLst>
+            <pc:docMk/>
+            <pc:sldMk cId="1571003302" sldId="263"/>
+            <ac:picMk id="10" creationId="{5AFB9A98-2EBB-F07D-6FB0-44DA38B50B93}"/>
+          </ac:picMkLst>
+        </pc:picChg>
+      </pc:sldChg>
+      <pc:sldChg chg="addSp delSp modSp add mod">
+        <pc:chgData name="Lua Irene" userId="985ce29fe78d48e8" providerId="LiveId" clId="{E4812FB7-248D-4EA9-A727-1D8D0F5CA002}" dt="2025-05-30T18:09:30.919" v="141" actId="20577"/>
+        <pc:sldMkLst>
+          <pc:docMk/>
+          <pc:sldMk cId="4077187995" sldId="264"/>
+        </pc:sldMkLst>
+        <pc:spChg chg="add del mod">
+          <ac:chgData name="Lua Irene" userId="985ce29fe78d48e8" providerId="LiveId" clId="{E4812FB7-248D-4EA9-A727-1D8D0F5CA002}" dt="2025-05-30T18:08:39.114" v="109" actId="22"/>
+          <ac:spMkLst>
+            <pc:docMk/>
+            <pc:sldMk cId="4077187995" sldId="264"/>
+            <ac:spMk id="3" creationId="{F7D20E62-92EB-52B8-98BC-46383B59742D}"/>
+          </ac:spMkLst>
+        </pc:spChg>
+        <pc:spChg chg="mod">
+          <ac:chgData name="Lua Irene" userId="985ce29fe78d48e8" providerId="LiveId" clId="{E4812FB7-248D-4EA9-A727-1D8D0F5CA002}" dt="2025-05-30T18:09:30.919" v="141" actId="20577"/>
+          <ac:spMkLst>
+            <pc:docMk/>
+            <pc:sldMk cId="4077187995" sldId="264"/>
+            <ac:spMk id="4" creationId="{B004E2A5-90FB-4474-5B24-2CACB0DD1F50}"/>
+          </ac:spMkLst>
+        </pc:spChg>
+        <pc:spChg chg="add del mod">
+          <ac:chgData name="Lua Irene" userId="985ce29fe78d48e8" providerId="LiveId" clId="{E4812FB7-248D-4EA9-A727-1D8D0F5CA002}" dt="2025-05-30T18:09:08.974" v="110" actId="22"/>
+          <ac:spMkLst>
+            <pc:docMk/>
+            <pc:sldMk cId="4077187995" sldId="264"/>
+            <ac:spMk id="6" creationId="{984C0097-9F2B-0A4A-F650-30F310D8E88D}"/>
+          </ac:spMkLst>
+        </pc:spChg>
+        <pc:picChg chg="del">
+          <ac:chgData name="Lua Irene" userId="985ce29fe78d48e8" providerId="LiveId" clId="{E4812FB7-248D-4EA9-A727-1D8D0F5CA002}" dt="2025-05-30T18:08:03.833" v="105" actId="478"/>
+          <ac:picMkLst>
+            <pc:docMk/>
+            <pc:sldMk cId="4077187995" sldId="264"/>
+            <ac:picMk id="8" creationId="{7A1BFE28-F4A6-EBBD-6D09-4D99B988AEC9}"/>
+          </ac:picMkLst>
+        </pc:picChg>
+        <pc:picChg chg="add del">
+          <ac:chgData name="Lua Irene" userId="985ce29fe78d48e8" providerId="LiveId" clId="{E4812FB7-248D-4EA9-A727-1D8D0F5CA002}" dt="2025-05-30T18:08:34.749" v="108" actId="478"/>
+          <ac:picMkLst>
+            <pc:docMk/>
+            <pc:sldMk cId="4077187995" sldId="264"/>
+            <ac:picMk id="9" creationId="{9D9051E4-5FF3-8741-F1D8-08CB1135BB00}"/>
+          </ac:picMkLst>
+        </pc:picChg>
+        <pc:picChg chg="del">
+          <ac:chgData name="Lua Irene" userId="985ce29fe78d48e8" providerId="LiveId" clId="{E4812FB7-248D-4EA9-A727-1D8D0F5CA002}" dt="2025-05-30T18:08:04.857" v="106" actId="478"/>
+          <ac:picMkLst>
+            <pc:docMk/>
+            <pc:sldMk cId="4077187995" sldId="264"/>
+            <ac:picMk id="10" creationId="{E5119DEC-734D-8655-5441-B84947DC35DA}"/>
+          </ac:picMkLst>
+        </pc:picChg>
+        <pc:picChg chg="add mod ord">
+          <ac:chgData name="Lua Irene" userId="985ce29fe78d48e8" providerId="LiveId" clId="{E4812FB7-248D-4EA9-A727-1D8D0F5CA002}" dt="2025-05-30T18:08:39.114" v="109" actId="22"/>
+          <ac:picMkLst>
+            <pc:docMk/>
+            <pc:sldMk cId="4077187995" sldId="264"/>
+            <ac:picMk id="12" creationId="{B8FFDD96-AC90-03BF-1F61-E73120F19DCC}"/>
+          </ac:picMkLst>
+        </pc:picChg>
+        <pc:picChg chg="add mod ord">
+          <ac:chgData name="Lua Irene" userId="985ce29fe78d48e8" providerId="LiveId" clId="{E4812FB7-248D-4EA9-A727-1D8D0F5CA002}" dt="2025-05-30T18:09:08.974" v="110" actId="22"/>
+          <ac:picMkLst>
+            <pc:docMk/>
+            <pc:sldMk cId="4077187995" sldId="264"/>
+            <ac:picMk id="14" creationId="{BCB1E46D-6F19-F5EC-8426-B77C785E9531}"/>
+          </ac:picMkLst>
+        </pc:picChg>
+      </pc:sldChg>
+      <pc:sldChg chg="addSp delSp modSp new mod">
+        <pc:chgData name="Lua Irene" userId="985ce29fe78d48e8" providerId="LiveId" clId="{E4812FB7-248D-4EA9-A727-1D8D0F5CA002}" dt="2025-05-30T18:11:07.771" v="181" actId="20577"/>
+        <pc:sldMkLst>
+          <pc:docMk/>
+          <pc:sldMk cId="2884575295" sldId="265"/>
+        </pc:sldMkLst>
+        <pc:spChg chg="mod">
+          <ac:chgData name="Lua Irene" userId="985ce29fe78d48e8" providerId="LiveId" clId="{E4812FB7-248D-4EA9-A727-1D8D0F5CA002}" dt="2025-05-30T18:11:07.771" v="181" actId="20577"/>
+          <ac:spMkLst>
+            <pc:docMk/>
+            <pc:sldMk cId="2884575295" sldId="265"/>
+            <ac:spMk id="2" creationId="{0BB4F059-704C-4D66-55E6-83E1A0FC249B}"/>
+          </ac:spMkLst>
+        </pc:spChg>
+        <pc:spChg chg="del">
+          <ac:chgData name="Lua Irene" userId="985ce29fe78d48e8" providerId="LiveId" clId="{E4812FB7-248D-4EA9-A727-1D8D0F5CA002}" dt="2025-05-30T18:10:25.352" v="143" actId="22"/>
+          <ac:spMkLst>
+            <pc:docMk/>
+            <pc:sldMk cId="2884575295" sldId="265"/>
+            <ac:spMk id="3" creationId="{F94C2AA8-2375-43B0-7E4C-1EC2D0D5B549}"/>
+          </ac:spMkLst>
+        </pc:spChg>
+        <pc:spChg chg="del">
+          <ac:chgData name="Lua Irene" userId="985ce29fe78d48e8" providerId="LiveId" clId="{E4812FB7-248D-4EA9-A727-1D8D0F5CA002}" dt="2025-05-30T18:10:51.829" v="144" actId="22"/>
+          <ac:spMkLst>
+            <pc:docMk/>
+            <pc:sldMk cId="2884575295" sldId="265"/>
+            <ac:spMk id="4" creationId="{06EF3B7A-FD6E-2515-2407-6E44EA96DE1A}"/>
+          </ac:spMkLst>
+        </pc:spChg>
+        <pc:picChg chg="add mod ord">
+          <ac:chgData name="Lua Irene" userId="985ce29fe78d48e8" providerId="LiveId" clId="{E4812FB7-248D-4EA9-A727-1D8D0F5CA002}" dt="2025-05-30T18:10:25.352" v="143" actId="22"/>
+          <ac:picMkLst>
+            <pc:docMk/>
+            <pc:sldMk cId="2884575295" sldId="265"/>
+            <ac:picMk id="6" creationId="{FB2EB018-AE1E-63B7-8C86-D7F4700A9F4B}"/>
+          </ac:picMkLst>
+        </pc:picChg>
+        <pc:picChg chg="add mod ord">
+          <ac:chgData name="Lua Irene" userId="985ce29fe78d48e8" providerId="LiveId" clId="{E4812FB7-248D-4EA9-A727-1D8D0F5CA002}" dt="2025-05-30T18:10:51.829" v="144" actId="22"/>
+          <ac:picMkLst>
+            <pc:docMk/>
+            <pc:sldMk cId="2884575295" sldId="265"/>
+            <ac:picMk id="8" creationId="{71F714B2-39B6-CC30-9530-D7C83177B900}"/>
+          </ac:picMkLst>
+        </pc:picChg>
+      </pc:sldChg>
+      <pc:sldChg chg="addSp delSp modSp new mod">
+        <pc:chgData name="Lua Irene" userId="985ce29fe78d48e8" providerId="LiveId" clId="{E4812FB7-248D-4EA9-A727-1D8D0F5CA002}" dt="2025-05-30T18:12:19.202" v="198" actId="20577"/>
+        <pc:sldMkLst>
+          <pc:docMk/>
+          <pc:sldMk cId="4141362416" sldId="266"/>
+        </pc:sldMkLst>
+        <pc:spChg chg="mod">
+          <ac:chgData name="Lua Irene" userId="985ce29fe78d48e8" providerId="LiveId" clId="{E4812FB7-248D-4EA9-A727-1D8D0F5CA002}" dt="2025-05-30T18:12:19.202" v="198" actId="20577"/>
+          <ac:spMkLst>
+            <pc:docMk/>
+            <pc:sldMk cId="4141362416" sldId="266"/>
+            <ac:spMk id="2" creationId="{13AB3A9A-6EBF-66B6-47EB-D188066586B4}"/>
+          </ac:spMkLst>
+        </pc:spChg>
+        <pc:spChg chg="del">
+          <ac:chgData name="Lua Irene" userId="985ce29fe78d48e8" providerId="LiveId" clId="{E4812FB7-248D-4EA9-A727-1D8D0F5CA002}" dt="2025-05-30T18:11:50.872" v="183" actId="22"/>
+          <ac:spMkLst>
+            <pc:docMk/>
+            <pc:sldMk cId="4141362416" sldId="266"/>
+            <ac:spMk id="3" creationId="{70151ECB-A8C6-F3A1-72CC-1FFC8FD87BFC}"/>
+          </ac:spMkLst>
+        </pc:spChg>
+        <pc:spChg chg="del">
+          <ac:chgData name="Lua Irene" userId="985ce29fe78d48e8" providerId="LiveId" clId="{E4812FB7-248D-4EA9-A727-1D8D0F5CA002}" dt="2025-05-30T18:12:10.449" v="184" actId="22"/>
+          <ac:spMkLst>
+            <pc:docMk/>
+            <pc:sldMk cId="4141362416" sldId="266"/>
+            <ac:spMk id="4" creationId="{A6F0CE51-969E-0A84-8A7F-B606B01C38F9}"/>
+          </ac:spMkLst>
+        </pc:spChg>
+        <pc:picChg chg="add mod ord">
+          <ac:chgData name="Lua Irene" userId="985ce29fe78d48e8" providerId="LiveId" clId="{E4812FB7-248D-4EA9-A727-1D8D0F5CA002}" dt="2025-05-30T18:11:50.872" v="183" actId="22"/>
+          <ac:picMkLst>
+            <pc:docMk/>
+            <pc:sldMk cId="4141362416" sldId="266"/>
+            <ac:picMk id="6" creationId="{66036DD2-BEAF-7FC0-A8ED-8512276B838B}"/>
+          </ac:picMkLst>
+        </pc:picChg>
+        <pc:picChg chg="add mod ord">
+          <ac:chgData name="Lua Irene" userId="985ce29fe78d48e8" providerId="LiveId" clId="{E4812FB7-248D-4EA9-A727-1D8D0F5CA002}" dt="2025-05-30T18:12:10.449" v="184" actId="22"/>
+          <ac:picMkLst>
+            <pc:docMk/>
+            <pc:sldMk cId="4141362416" sldId="266"/>
+            <ac:picMk id="8" creationId="{7597145E-F094-1633-7DF1-81553CB303A7}"/>
+          </ac:picMkLst>
+        </pc:picChg>
+      </pc:sldChg>
+      <pc:sldChg chg="addSp delSp modSp new mod">
+        <pc:chgData name="Lua Irene" userId="985ce29fe78d48e8" providerId="LiveId" clId="{E4812FB7-248D-4EA9-A727-1D8D0F5CA002}" dt="2025-05-30T18:19:27.652" v="275" actId="20577"/>
+        <pc:sldMkLst>
+          <pc:docMk/>
+          <pc:sldMk cId="523917959" sldId="267"/>
+        </pc:sldMkLst>
+        <pc:spChg chg="mod">
+          <ac:chgData name="Lua Irene" userId="985ce29fe78d48e8" providerId="LiveId" clId="{E4812FB7-248D-4EA9-A727-1D8D0F5CA002}" dt="2025-05-30T18:19:27.652" v="275" actId="20577"/>
+          <ac:spMkLst>
+            <pc:docMk/>
+            <pc:sldMk cId="523917959" sldId="267"/>
+            <ac:spMk id="2" creationId="{739AD3BE-FC63-671A-F09A-308FE4E50E2A}"/>
+          </ac:spMkLst>
+        </pc:spChg>
+        <pc:spChg chg="del">
+          <ac:chgData name="Lua Irene" userId="985ce29fe78d48e8" providerId="LiveId" clId="{E4812FB7-248D-4EA9-A727-1D8D0F5CA002}" dt="2025-05-30T18:13:33.017" v="200" actId="22"/>
+          <ac:spMkLst>
+            <pc:docMk/>
+            <pc:sldMk cId="523917959" sldId="267"/>
+            <ac:spMk id="3" creationId="{8E519D25-73C1-FDD7-14B1-12423F8DC194}"/>
+          </ac:spMkLst>
+        </pc:spChg>
+        <pc:spChg chg="del">
+          <ac:chgData name="Lua Irene" userId="985ce29fe78d48e8" providerId="LiveId" clId="{E4812FB7-248D-4EA9-A727-1D8D0F5CA002}" dt="2025-05-30T18:13:50.942" v="201" actId="22"/>
+          <ac:spMkLst>
+            <pc:docMk/>
+            <pc:sldMk cId="523917959" sldId="267"/>
+            <ac:spMk id="4" creationId="{391AE524-FFBD-0D46-676C-90CDED75BF35}"/>
+          </ac:spMkLst>
+        </pc:spChg>
+        <pc:picChg chg="add mod ord">
+          <ac:chgData name="Lua Irene" userId="985ce29fe78d48e8" providerId="LiveId" clId="{E4812FB7-248D-4EA9-A727-1D8D0F5CA002}" dt="2025-05-30T18:13:33.017" v="200" actId="22"/>
+          <ac:picMkLst>
+            <pc:docMk/>
+            <pc:sldMk cId="523917959" sldId="267"/>
+            <ac:picMk id="6" creationId="{EFE04EFB-7BCE-2485-A9E7-E83BC37D64FF}"/>
+          </ac:picMkLst>
+        </pc:picChg>
+        <pc:picChg chg="add mod ord">
+          <ac:chgData name="Lua Irene" userId="985ce29fe78d48e8" providerId="LiveId" clId="{E4812FB7-248D-4EA9-A727-1D8D0F5CA002}" dt="2025-05-30T18:13:50.942" v="201" actId="22"/>
+          <ac:picMkLst>
+            <pc:docMk/>
+            <pc:sldMk cId="523917959" sldId="267"/>
+            <ac:picMk id="8" creationId="{06163270-B7BF-05F5-7BBB-368242F20A19}"/>
+          </ac:picMkLst>
+        </pc:picChg>
+      </pc:sldChg>
+      <pc:sldChg chg="addSp delSp modSp new mod">
+        <pc:chgData name="Lua Irene" userId="985ce29fe78d48e8" providerId="LiveId" clId="{E4812FB7-248D-4EA9-A727-1D8D0F5CA002}" dt="2025-05-30T18:15:25.277" v="229" actId="22"/>
+        <pc:sldMkLst>
+          <pc:docMk/>
+          <pc:sldMk cId="19307880" sldId="268"/>
+        </pc:sldMkLst>
+        <pc:spChg chg="mod">
+          <ac:chgData name="Lua Irene" userId="985ce29fe78d48e8" providerId="LiveId" clId="{E4812FB7-248D-4EA9-A727-1D8D0F5CA002}" dt="2025-05-30T18:14:28.391" v="228" actId="20577"/>
+          <ac:spMkLst>
+            <pc:docMk/>
+            <pc:sldMk cId="19307880" sldId="268"/>
+            <ac:spMk id="2" creationId="{3D804F9D-99DE-60DF-EDD2-66AFB7559089}"/>
+          </ac:spMkLst>
+        </pc:spChg>
+        <pc:spChg chg="del">
+          <ac:chgData name="Lua Irene" userId="985ce29fe78d48e8" providerId="LiveId" clId="{E4812FB7-248D-4EA9-A727-1D8D0F5CA002}" dt="2025-05-30T18:14:25.115" v="220" actId="22"/>
+          <ac:spMkLst>
+            <pc:docMk/>
+            <pc:sldMk cId="19307880" sldId="268"/>
+            <ac:spMk id="3" creationId="{F3CD5BFC-BFF9-A2DA-2D08-04F2978A1F99}"/>
+          </ac:spMkLst>
+        </pc:spChg>
+        <pc:spChg chg="del">
+          <ac:chgData name="Lua Irene" userId="985ce29fe78d48e8" providerId="LiveId" clId="{E4812FB7-248D-4EA9-A727-1D8D0F5CA002}" dt="2025-05-30T18:15:25.277" v="229" actId="22"/>
+          <ac:spMkLst>
+            <pc:docMk/>
+            <pc:sldMk cId="19307880" sldId="268"/>
+            <ac:spMk id="4" creationId="{85FAF588-0B63-024F-B6C1-C83AA4A0987E}"/>
+          </ac:spMkLst>
+        </pc:spChg>
+        <pc:picChg chg="add mod ord">
+          <ac:chgData name="Lua Irene" userId="985ce29fe78d48e8" providerId="LiveId" clId="{E4812FB7-248D-4EA9-A727-1D8D0F5CA002}" dt="2025-05-30T18:14:25.115" v="220" actId="22"/>
+          <ac:picMkLst>
+            <pc:docMk/>
+            <pc:sldMk cId="19307880" sldId="268"/>
+            <ac:picMk id="6" creationId="{2BDD0CFE-B80B-8A38-E723-D5418F9ACCC5}"/>
+          </ac:picMkLst>
+        </pc:picChg>
+        <pc:picChg chg="add mod ord">
+          <ac:chgData name="Lua Irene" userId="985ce29fe78d48e8" providerId="LiveId" clId="{E4812FB7-248D-4EA9-A727-1D8D0F5CA002}" dt="2025-05-30T18:15:25.277" v="229" actId="22"/>
+          <ac:picMkLst>
+            <pc:docMk/>
+            <pc:sldMk cId="19307880" sldId="268"/>
+            <ac:picMk id="8" creationId="{013F09AB-909A-2199-2BE0-2A4804327CF9}"/>
+          </ac:picMkLst>
+        </pc:picChg>
+      </pc:sldChg>
+      <pc:sldChg chg="addSp delSp modSp new mod modClrScheme chgLayout">
+        <pc:chgData name="Lua Irene" userId="985ce29fe78d48e8" providerId="LiveId" clId="{E4812FB7-248D-4EA9-A727-1D8D0F5CA002}" dt="2025-05-30T18:18:54.901" v="274" actId="14100"/>
+        <pc:sldMkLst>
+          <pc:docMk/>
+          <pc:sldMk cId="1013922298" sldId="269"/>
+        </pc:sldMkLst>
+        <pc:spChg chg="del mod ord">
+          <ac:chgData name="Lua Irene" userId="985ce29fe78d48e8" providerId="LiveId" clId="{E4812FB7-248D-4EA9-A727-1D8D0F5CA002}" dt="2025-05-30T18:15:51.548" v="231" actId="700"/>
+          <ac:spMkLst>
+            <pc:docMk/>
+            <pc:sldMk cId="1013922298" sldId="269"/>
+            <ac:spMk id="2" creationId="{191199AD-333E-81D4-24E5-DECF2EB1ACA5}"/>
+          </ac:spMkLst>
+        </pc:spChg>
+        <pc:spChg chg="del">
+          <ac:chgData name="Lua Irene" userId="985ce29fe78d48e8" providerId="LiveId" clId="{E4812FB7-248D-4EA9-A727-1D8D0F5CA002}" dt="2025-05-30T18:15:51.548" v="231" actId="700"/>
+          <ac:spMkLst>
+            <pc:docMk/>
+            <pc:sldMk cId="1013922298" sldId="269"/>
+            <ac:spMk id="3" creationId="{C87E1F5F-6FD6-5EE0-527A-217180F419AD}"/>
+          </ac:spMkLst>
+        </pc:spChg>
+        <pc:spChg chg="add mod ord">
+          <ac:chgData name="Lua Irene" userId="985ce29fe78d48e8" providerId="LiveId" clId="{E4812FB7-248D-4EA9-A727-1D8D0F5CA002}" dt="2025-05-30T18:18:54.901" v="274" actId="14100"/>
+          <ac:spMkLst>
+            <pc:docMk/>
+            <pc:sldMk cId="1013922298" sldId="269"/>
+            <ac:spMk id="4" creationId="{CBDA68CA-BC9B-6191-C634-DBE257A0D22A}"/>
+          </ac:spMkLst>
+        </pc:spChg>
+        <pc:spChg chg="add del mod ord">
+          <ac:chgData name="Lua Irene" userId="985ce29fe78d48e8" providerId="LiveId" clId="{E4812FB7-248D-4EA9-A727-1D8D0F5CA002}" dt="2025-05-30T18:18:26.422" v="269" actId="478"/>
+          <ac:spMkLst>
+            <pc:docMk/>
+            <pc:sldMk cId="1013922298" sldId="269"/>
+            <ac:spMk id="5" creationId="{7E3158E9-CCAE-6288-EAFC-684A4E034446}"/>
+          </ac:spMkLst>
+        </pc:spChg>
+        <pc:spChg chg="add del mod">
+          <ac:chgData name="Lua Irene" userId="985ce29fe78d48e8" providerId="LiveId" clId="{E4812FB7-248D-4EA9-A727-1D8D0F5CA002}" dt="2025-05-30T18:18:31.664" v="270" actId="478"/>
+          <ac:spMkLst>
+            <pc:docMk/>
+            <pc:sldMk cId="1013922298" sldId="269"/>
+            <ac:spMk id="7" creationId="{4F87EECF-EAB8-1E52-0243-5EDAAA26E6C6}"/>
           </ac:spMkLst>
         </pc:spChg>
       </pc:sldChg>
@@ -4002,6 +4386,240 @@
 </p:sld>
 </file>
 
+<file path=ppt/slides/slide10.xml><?xml version="1.0" encoding="utf-8"?>
+<p:sld xmlns:a="http://schemas.openxmlformats.org/drawingml/2006/main" xmlns:r="http://schemas.openxmlformats.org/officeDocument/2006/relationships" xmlns:p="http://schemas.openxmlformats.org/presentationml/2006/main">
+  <p:cSld>
+    <p:spTree>
+      <p:nvGrpSpPr>
+        <p:cNvPr id="1" name=""/>
+        <p:cNvGrpSpPr/>
+        <p:nvPr/>
+      </p:nvGrpSpPr>
+      <p:grpSpPr>
+        <a:xfrm>
+          <a:off x="0" y="0"/>
+          <a:ext cx="0" cy="0"/>
+          <a:chOff x="0" y="0"/>
+          <a:chExt cx="0" cy="0"/>
+        </a:xfrm>
+      </p:grpSpPr>
+      <p:sp>
+        <p:nvSpPr>
+          <p:cNvPr id="2" name="Title 1">
+            <a:extLst>
+              <a:ext uri="{FF2B5EF4-FFF2-40B4-BE49-F238E27FC236}">
+                <a16:creationId xmlns:a16="http://schemas.microsoft.com/office/drawing/2014/main" id="{739AD3BE-FC63-671A-F09A-308FE4E50E2A}"/>
+              </a:ext>
+            </a:extLst>
+          </p:cNvPr>
+          <p:cNvSpPr>
+            <a:spLocks noGrp="1"/>
+          </p:cNvSpPr>
+          <p:nvPr>
+            <p:ph type="title"/>
+          </p:nvPr>
+        </p:nvSpPr>
+        <p:spPr/>
+        <p:txBody>
+          <a:bodyPr/>
+          <a:lstStyle/>
+          <a:p>
+            <a:r>
+              <a:rPr lang="en-US" dirty="0"/>
+              <a:t>Chatbot</a:t>
+            </a:r>
+            <a:endParaRPr lang="en-SG" dirty="0"/>
+          </a:p>
+        </p:txBody>
+      </p:sp>
+      <p:pic>
+        <p:nvPicPr>
+          <p:cNvPr id="6" name="Content Placeholder 5">
+            <a:extLst>
+              <a:ext uri="{FF2B5EF4-FFF2-40B4-BE49-F238E27FC236}">
+                <a16:creationId xmlns:a16="http://schemas.microsoft.com/office/drawing/2014/main" id="{EFE04EFB-7BCE-2485-A9E7-E83BC37D64FF}"/>
+              </a:ext>
+            </a:extLst>
+          </p:cNvPr>
+          <p:cNvPicPr>
+            <a:picLocks noGrp="1" noChangeAspect="1"/>
+          </p:cNvPicPr>
+          <p:nvPr>
+            <p:ph sz="half" idx="1"/>
+          </p:nvPr>
+        </p:nvPicPr>
+        <p:blipFill>
+          <a:blip r:embed="rId2"/>
+          <a:stretch>
+            <a:fillRect/>
+          </a:stretch>
+        </p:blipFill>
+        <p:spPr>
+          <a:xfrm>
+            <a:off x="1124727" y="2344723"/>
+            <a:ext cx="4552983" cy="3905279"/>
+          </a:xfrm>
+        </p:spPr>
+      </p:pic>
+      <p:pic>
+        <p:nvPicPr>
+          <p:cNvPr id="8" name="Content Placeholder 7">
+            <a:extLst>
+              <a:ext uri="{FF2B5EF4-FFF2-40B4-BE49-F238E27FC236}">
+                <a16:creationId xmlns:a16="http://schemas.microsoft.com/office/drawing/2014/main" id="{06163270-B7BF-05F5-7BBB-368242F20A19}"/>
+              </a:ext>
+            </a:extLst>
+          </p:cNvPr>
+          <p:cNvPicPr>
+            <a:picLocks noGrp="1" noChangeAspect="1"/>
+          </p:cNvPicPr>
+          <p:nvPr>
+            <p:ph sz="half" idx="2"/>
+          </p:nvPr>
+        </p:nvPicPr>
+        <p:blipFill>
+          <a:blip r:embed="rId3"/>
+          <a:stretch>
+            <a:fillRect/>
+          </a:stretch>
+        </p:blipFill>
+        <p:spPr>
+          <a:xfrm>
+            <a:off x="6515065" y="2286000"/>
+            <a:ext cx="3703708" cy="4022725"/>
+          </a:xfrm>
+        </p:spPr>
+      </p:pic>
+    </p:spTree>
+    <p:extLst>
+      <p:ext uri="{BB962C8B-B14F-4D97-AF65-F5344CB8AC3E}">
+        <p14:creationId xmlns:p14="http://schemas.microsoft.com/office/powerpoint/2010/main" val="523917959"/>
+      </p:ext>
+    </p:extLst>
+  </p:cSld>
+  <p:clrMapOvr>
+    <a:masterClrMapping/>
+  </p:clrMapOvr>
+</p:sld>
+</file>
+
+<file path=ppt/slides/slide11.xml><?xml version="1.0" encoding="utf-8"?>
+<p:sld xmlns:a="http://schemas.openxmlformats.org/drawingml/2006/main" xmlns:r="http://schemas.openxmlformats.org/officeDocument/2006/relationships" xmlns:p="http://schemas.openxmlformats.org/presentationml/2006/main">
+  <p:cSld>
+    <p:spTree>
+      <p:nvGrpSpPr>
+        <p:cNvPr id="1" name=""/>
+        <p:cNvGrpSpPr/>
+        <p:nvPr/>
+      </p:nvGrpSpPr>
+      <p:grpSpPr>
+        <a:xfrm>
+          <a:off x="0" y="0"/>
+          <a:ext cx="0" cy="0"/>
+          <a:chOff x="0" y="0"/>
+          <a:chExt cx="0" cy="0"/>
+        </a:xfrm>
+      </p:grpSpPr>
+      <p:sp>
+        <p:nvSpPr>
+          <p:cNvPr id="2" name="Title 1">
+            <a:extLst>
+              <a:ext uri="{FF2B5EF4-FFF2-40B4-BE49-F238E27FC236}">
+                <a16:creationId xmlns:a16="http://schemas.microsoft.com/office/drawing/2014/main" id="{3D804F9D-99DE-60DF-EDD2-66AFB7559089}"/>
+              </a:ext>
+            </a:extLst>
+          </p:cNvPr>
+          <p:cNvSpPr>
+            <a:spLocks noGrp="1"/>
+          </p:cNvSpPr>
+          <p:nvPr>
+            <p:ph type="title"/>
+          </p:nvPr>
+        </p:nvSpPr>
+        <p:spPr/>
+        <p:txBody>
+          <a:bodyPr/>
+          <a:lstStyle/>
+          <a:p>
+            <a:r>
+              <a:rPr lang="en-US" dirty="0"/>
+              <a:t>Telegram</a:t>
+            </a:r>
+            <a:endParaRPr lang="en-SG" dirty="0"/>
+          </a:p>
+        </p:txBody>
+      </p:sp>
+      <p:pic>
+        <p:nvPicPr>
+          <p:cNvPr id="6" name="Content Placeholder 5">
+            <a:extLst>
+              <a:ext uri="{FF2B5EF4-FFF2-40B4-BE49-F238E27FC236}">
+                <a16:creationId xmlns:a16="http://schemas.microsoft.com/office/drawing/2014/main" id="{2BDD0CFE-B80B-8A38-E723-D5418F9ACCC5}"/>
+              </a:ext>
+            </a:extLst>
+          </p:cNvPr>
+          <p:cNvPicPr>
+            <a:picLocks noGrp="1" noChangeAspect="1"/>
+          </p:cNvPicPr>
+          <p:nvPr>
+            <p:ph sz="half" idx="1"/>
+          </p:nvPr>
+        </p:nvPicPr>
+        <p:blipFill>
+          <a:blip r:embed="rId2"/>
+          <a:stretch>
+            <a:fillRect/>
+          </a:stretch>
+        </p:blipFill>
+        <p:spPr>
+          <a:xfrm>
+            <a:off x="1158065" y="2673338"/>
+            <a:ext cx="4486308" cy="3248049"/>
+          </a:xfrm>
+        </p:spPr>
+      </p:pic>
+      <p:pic>
+        <p:nvPicPr>
+          <p:cNvPr id="8" name="Content Placeholder 7">
+            <a:extLst>
+              <a:ext uri="{FF2B5EF4-FFF2-40B4-BE49-F238E27FC236}">
+                <a16:creationId xmlns:a16="http://schemas.microsoft.com/office/drawing/2014/main" id="{013F09AB-909A-2199-2BE0-2A4804327CF9}"/>
+              </a:ext>
+            </a:extLst>
+          </p:cNvPr>
+          <p:cNvPicPr>
+            <a:picLocks noGrp="1" noChangeAspect="1"/>
+          </p:cNvPicPr>
+          <p:nvPr>
+            <p:ph sz="half" idx="2"/>
+          </p:nvPr>
+        </p:nvPicPr>
+        <p:blipFill>
+          <a:blip r:embed="rId3"/>
+          <a:stretch>
+            <a:fillRect/>
+          </a:stretch>
+        </p:blipFill>
+        <p:spPr>
+          <a:xfrm>
+            <a:off x="5989638" y="2564071"/>
+            <a:ext cx="4754562" cy="3466582"/>
+          </a:xfrm>
+        </p:spPr>
+      </p:pic>
+    </p:spTree>
+    <p:extLst>
+      <p:ext uri="{BB962C8B-B14F-4D97-AF65-F5344CB8AC3E}">
+        <p14:creationId xmlns:p14="http://schemas.microsoft.com/office/powerpoint/2010/main" val="19307880"/>
+      </p:ext>
+    </p:extLst>
+  </p:cSld>
+  <p:clrMapOvr>
+    <a:masterClrMapping/>
+  </p:clrMapOvr>
+</p:sld>
+</file>
+
 <file path=ppt/slides/slide2.xml><?xml version="1.0" encoding="utf-8"?>
 <p:sld xmlns:a="http://schemas.openxmlformats.org/drawingml/2006/main" xmlns:r="http://schemas.openxmlformats.org/officeDocument/2006/relationships" xmlns:p="http://schemas.openxmlformats.org/presentationml/2006/main">
   <p:cSld>
@@ -4379,6 +4997,556 @@
     <p:extLst>
       <p:ext uri="{BB962C8B-B14F-4D97-AF65-F5344CB8AC3E}">
         <p14:creationId xmlns:p14="http://schemas.microsoft.com/office/powerpoint/2010/main" val="1495264617"/>
+      </p:ext>
+    </p:extLst>
+  </p:cSld>
+  <p:clrMapOvr>
+    <a:masterClrMapping/>
+  </p:clrMapOvr>
+</p:sld>
+</file>
+
+<file path=ppt/slides/slide5.xml><?xml version="1.0" encoding="utf-8"?>
+<p:sld xmlns:a="http://schemas.openxmlformats.org/drawingml/2006/main" xmlns:r="http://schemas.openxmlformats.org/officeDocument/2006/relationships" xmlns:p="http://schemas.openxmlformats.org/presentationml/2006/main">
+  <p:cSld>
+    <p:spTree>
+      <p:nvGrpSpPr>
+        <p:cNvPr id="1" name=""/>
+        <p:cNvGrpSpPr/>
+        <p:nvPr/>
+      </p:nvGrpSpPr>
+      <p:grpSpPr>
+        <a:xfrm>
+          <a:off x="0" y="0"/>
+          <a:ext cx="0" cy="0"/>
+          <a:chOff x="0" y="0"/>
+          <a:chExt cx="0" cy="0"/>
+        </a:xfrm>
+      </p:grpSpPr>
+      <p:sp>
+        <p:nvSpPr>
+          <p:cNvPr id="4" name="Title 3">
+            <a:extLst>
+              <a:ext uri="{FF2B5EF4-FFF2-40B4-BE49-F238E27FC236}">
+                <a16:creationId xmlns:a16="http://schemas.microsoft.com/office/drawing/2014/main" id="{CBDA68CA-BC9B-6191-C634-DBE257A0D22A}"/>
+              </a:ext>
+            </a:extLst>
+          </p:cNvPr>
+          <p:cNvSpPr>
+            <a:spLocks noGrp="1"/>
+          </p:cNvSpPr>
+          <p:nvPr>
+            <p:ph type="title"/>
+          </p:nvPr>
+        </p:nvSpPr>
+        <p:spPr>
+          <a:xfrm>
+            <a:off x="6550660" y="1812695"/>
+            <a:ext cx="5363836" cy="3830653"/>
+          </a:xfrm>
+        </p:spPr>
+        <p:txBody>
+          <a:bodyPr>
+            <a:normAutofit/>
+          </a:bodyPr>
+          <a:lstStyle/>
+          <a:p>
+            <a:r>
+              <a:rPr lang="en-US" dirty="0"/>
+              <a:t>Web application</a:t>
+            </a:r>
+            <a:br>
+              <a:rPr lang="en-US" dirty="0"/>
+            </a:br>
+            <a:br>
+              <a:rPr lang="en-US" dirty="0"/>
+            </a:br>
+            <a:r>
+              <a:rPr lang="en-SG" sz="3000" b="1" dirty="0"/>
+              <a:t>User Interface Overview</a:t>
+            </a:r>
+            <a:endParaRPr lang="en-SG" sz="3000" dirty="0"/>
+          </a:p>
+        </p:txBody>
+      </p:sp>
+    </p:spTree>
+    <p:extLst>
+      <p:ext uri="{BB962C8B-B14F-4D97-AF65-F5344CB8AC3E}">
+        <p14:creationId xmlns:p14="http://schemas.microsoft.com/office/powerpoint/2010/main" val="1013922298"/>
+      </p:ext>
+    </p:extLst>
+  </p:cSld>
+  <p:clrMapOvr>
+    <a:masterClrMapping/>
+  </p:clrMapOvr>
+</p:sld>
+</file>
+
+<file path=ppt/slides/slide6.xml><?xml version="1.0" encoding="utf-8"?>
+<p:sld xmlns:a="http://schemas.openxmlformats.org/drawingml/2006/main" xmlns:r="http://schemas.openxmlformats.org/officeDocument/2006/relationships" xmlns:p="http://schemas.openxmlformats.org/presentationml/2006/main">
+  <p:cSld>
+    <p:spTree>
+      <p:nvGrpSpPr>
+        <p:cNvPr id="1" name=""/>
+        <p:cNvGrpSpPr/>
+        <p:nvPr/>
+      </p:nvGrpSpPr>
+      <p:grpSpPr>
+        <a:xfrm>
+          <a:off x="0" y="0"/>
+          <a:ext cx="0" cy="0"/>
+          <a:chOff x="0" y="0"/>
+          <a:chExt cx="0" cy="0"/>
+        </a:xfrm>
+      </p:grpSpPr>
+      <p:sp>
+        <p:nvSpPr>
+          <p:cNvPr id="4" name="Title 3">
+            <a:extLst>
+              <a:ext uri="{FF2B5EF4-FFF2-40B4-BE49-F238E27FC236}">
+                <a16:creationId xmlns:a16="http://schemas.microsoft.com/office/drawing/2014/main" id="{B63ED963-757E-9E14-46EB-D3958D20F906}"/>
+              </a:ext>
+            </a:extLst>
+          </p:cNvPr>
+          <p:cNvSpPr>
+            <a:spLocks noGrp="1"/>
+          </p:cNvSpPr>
+          <p:nvPr>
+            <p:ph type="title"/>
+          </p:nvPr>
+        </p:nvSpPr>
+        <p:spPr/>
+        <p:txBody>
+          <a:bodyPr/>
+          <a:lstStyle/>
+          <a:p>
+            <a:r>
+              <a:rPr lang="en-US" dirty="0"/>
+              <a:t>Fin-GPT web applications</a:t>
+            </a:r>
+            <a:endParaRPr lang="en-SG" dirty="0"/>
+          </a:p>
+        </p:txBody>
+      </p:sp>
+      <p:pic>
+        <p:nvPicPr>
+          <p:cNvPr id="8" name="Content Placeholder 7">
+            <a:extLst>
+              <a:ext uri="{FF2B5EF4-FFF2-40B4-BE49-F238E27FC236}">
+                <a16:creationId xmlns:a16="http://schemas.microsoft.com/office/drawing/2014/main" id="{2E5BBDD6-A28E-0AD7-2C90-EEB21B2D5206}"/>
+              </a:ext>
+            </a:extLst>
+          </p:cNvPr>
+          <p:cNvPicPr>
+            <a:picLocks noGrp="1" noChangeAspect="1"/>
+          </p:cNvPicPr>
+          <p:nvPr>
+            <p:ph sz="half" idx="1"/>
+          </p:nvPr>
+        </p:nvPicPr>
+        <p:blipFill>
+          <a:blip r:embed="rId2"/>
+          <a:stretch>
+            <a:fillRect/>
+          </a:stretch>
+        </p:blipFill>
+        <p:spPr>
+          <a:xfrm>
+            <a:off x="1023938" y="2797920"/>
+            <a:ext cx="4754562" cy="2998885"/>
+          </a:xfrm>
+        </p:spPr>
+      </p:pic>
+      <p:pic>
+        <p:nvPicPr>
+          <p:cNvPr id="10" name="Content Placeholder 9">
+            <a:extLst>
+              <a:ext uri="{FF2B5EF4-FFF2-40B4-BE49-F238E27FC236}">
+                <a16:creationId xmlns:a16="http://schemas.microsoft.com/office/drawing/2014/main" id="{5AFB9A98-2EBB-F07D-6FB0-44DA38B50B93}"/>
+              </a:ext>
+            </a:extLst>
+          </p:cNvPr>
+          <p:cNvPicPr>
+            <a:picLocks noGrp="1" noChangeAspect="1"/>
+          </p:cNvPicPr>
+          <p:nvPr>
+            <p:ph sz="half" idx="2"/>
+          </p:nvPr>
+        </p:nvPicPr>
+        <p:blipFill>
+          <a:blip r:embed="rId3"/>
+          <a:stretch>
+            <a:fillRect/>
+          </a:stretch>
+        </p:blipFill>
+        <p:spPr>
+          <a:xfrm>
+            <a:off x="5989638" y="2999225"/>
+            <a:ext cx="4754562" cy="2596275"/>
+          </a:xfrm>
+        </p:spPr>
+      </p:pic>
+    </p:spTree>
+    <p:extLst>
+      <p:ext uri="{BB962C8B-B14F-4D97-AF65-F5344CB8AC3E}">
+        <p14:creationId xmlns:p14="http://schemas.microsoft.com/office/powerpoint/2010/main" val="1571003302"/>
+      </p:ext>
+    </p:extLst>
+  </p:cSld>
+  <p:clrMapOvr>
+    <a:masterClrMapping/>
+  </p:clrMapOvr>
+</p:sld>
+</file>
+
+<file path=ppt/slides/slide7.xml><?xml version="1.0" encoding="utf-8"?>
+<p:sld xmlns:a="http://schemas.openxmlformats.org/drawingml/2006/main" xmlns:r="http://schemas.openxmlformats.org/officeDocument/2006/relationships" xmlns:p="http://schemas.openxmlformats.org/presentationml/2006/main">
+  <p:cSld>
+    <p:spTree>
+      <p:nvGrpSpPr>
+        <p:cNvPr id="1" name="">
+          <a:extLst>
+            <a:ext uri="{FF2B5EF4-FFF2-40B4-BE49-F238E27FC236}">
+              <a16:creationId xmlns:a16="http://schemas.microsoft.com/office/drawing/2014/main" id="{C80C9FB8-6B27-1104-2E65-780203945880}"/>
+            </a:ext>
+          </a:extLst>
+        </p:cNvPr>
+        <p:cNvGrpSpPr/>
+        <p:nvPr/>
+      </p:nvGrpSpPr>
+      <p:grpSpPr>
+        <a:xfrm>
+          <a:off x="0" y="0"/>
+          <a:ext cx="0" cy="0"/>
+          <a:chOff x="0" y="0"/>
+          <a:chExt cx="0" cy="0"/>
+        </a:xfrm>
+      </p:grpSpPr>
+      <p:sp>
+        <p:nvSpPr>
+          <p:cNvPr id="4" name="Title 3">
+            <a:extLst>
+              <a:ext uri="{FF2B5EF4-FFF2-40B4-BE49-F238E27FC236}">
+                <a16:creationId xmlns:a16="http://schemas.microsoft.com/office/drawing/2014/main" id="{B004E2A5-90FB-4474-5B24-2CACB0DD1F50}"/>
+              </a:ext>
+            </a:extLst>
+          </p:cNvPr>
+          <p:cNvSpPr>
+            <a:spLocks noGrp="1"/>
+          </p:cNvSpPr>
+          <p:nvPr>
+            <p:ph type="title"/>
+          </p:nvPr>
+        </p:nvSpPr>
+        <p:spPr/>
+        <p:txBody>
+          <a:bodyPr/>
+          <a:lstStyle/>
+          <a:p>
+            <a:r>
+              <a:rPr lang="en-US" dirty="0"/>
+              <a:t>User Log and Log Delete</a:t>
+            </a:r>
+            <a:endParaRPr lang="en-SG" dirty="0"/>
+          </a:p>
+        </p:txBody>
+      </p:sp>
+      <p:pic>
+        <p:nvPicPr>
+          <p:cNvPr id="12" name="Content Placeholder 11">
+            <a:extLst>
+              <a:ext uri="{FF2B5EF4-FFF2-40B4-BE49-F238E27FC236}">
+                <a16:creationId xmlns:a16="http://schemas.microsoft.com/office/drawing/2014/main" id="{B8FFDD96-AC90-03BF-1F61-E73120F19DCC}"/>
+              </a:ext>
+            </a:extLst>
+          </p:cNvPr>
+          <p:cNvPicPr>
+            <a:picLocks noGrp="1" noChangeAspect="1"/>
+          </p:cNvPicPr>
+          <p:nvPr>
+            <p:ph sz="half" idx="1"/>
+          </p:nvPr>
+        </p:nvPicPr>
+        <p:blipFill>
+          <a:blip r:embed="rId2"/>
+          <a:stretch>
+            <a:fillRect/>
+          </a:stretch>
+        </p:blipFill>
+        <p:spPr>
+          <a:xfrm>
+            <a:off x="1023938" y="2761380"/>
+            <a:ext cx="4754562" cy="3071964"/>
+          </a:xfrm>
+        </p:spPr>
+      </p:pic>
+      <p:pic>
+        <p:nvPicPr>
+          <p:cNvPr id="14" name="Content Placeholder 13">
+            <a:extLst>
+              <a:ext uri="{FF2B5EF4-FFF2-40B4-BE49-F238E27FC236}">
+                <a16:creationId xmlns:a16="http://schemas.microsoft.com/office/drawing/2014/main" id="{BCB1E46D-6F19-F5EC-8426-B77C785E9531}"/>
+              </a:ext>
+            </a:extLst>
+          </p:cNvPr>
+          <p:cNvPicPr>
+            <a:picLocks noGrp="1" noChangeAspect="1"/>
+          </p:cNvPicPr>
+          <p:nvPr>
+            <p:ph sz="half" idx="2"/>
+          </p:nvPr>
+        </p:nvPicPr>
+        <p:blipFill>
+          <a:blip r:embed="rId3"/>
+          <a:stretch>
+            <a:fillRect/>
+          </a:stretch>
+        </p:blipFill>
+        <p:spPr>
+          <a:xfrm>
+            <a:off x="6023752" y="3173404"/>
+            <a:ext cx="4686334" cy="2247916"/>
+          </a:xfrm>
+        </p:spPr>
+      </p:pic>
+    </p:spTree>
+    <p:extLst>
+      <p:ext uri="{BB962C8B-B14F-4D97-AF65-F5344CB8AC3E}">
+        <p14:creationId xmlns:p14="http://schemas.microsoft.com/office/powerpoint/2010/main" val="4077187995"/>
+      </p:ext>
+    </p:extLst>
+  </p:cSld>
+  <p:clrMapOvr>
+    <a:masterClrMapping/>
+  </p:clrMapOvr>
+</p:sld>
+</file>
+
+<file path=ppt/slides/slide8.xml><?xml version="1.0" encoding="utf-8"?>
+<p:sld xmlns:a="http://schemas.openxmlformats.org/drawingml/2006/main" xmlns:r="http://schemas.openxmlformats.org/officeDocument/2006/relationships" xmlns:p="http://schemas.openxmlformats.org/presentationml/2006/main">
+  <p:cSld>
+    <p:spTree>
+      <p:nvGrpSpPr>
+        <p:cNvPr id="1" name=""/>
+        <p:cNvGrpSpPr/>
+        <p:nvPr/>
+      </p:nvGrpSpPr>
+      <p:grpSpPr>
+        <a:xfrm>
+          <a:off x="0" y="0"/>
+          <a:ext cx="0" cy="0"/>
+          <a:chOff x="0" y="0"/>
+          <a:chExt cx="0" cy="0"/>
+        </a:xfrm>
+      </p:grpSpPr>
+      <p:sp>
+        <p:nvSpPr>
+          <p:cNvPr id="2" name="Title 1">
+            <a:extLst>
+              <a:ext uri="{FF2B5EF4-FFF2-40B4-BE49-F238E27FC236}">
+                <a16:creationId xmlns:a16="http://schemas.microsoft.com/office/drawing/2014/main" id="{0BB4F059-704C-4D66-55E6-83E1A0FC249B}"/>
+              </a:ext>
+            </a:extLst>
+          </p:cNvPr>
+          <p:cNvSpPr>
+            <a:spLocks noGrp="1"/>
+          </p:cNvSpPr>
+          <p:nvPr>
+            <p:ph type="title"/>
+          </p:nvPr>
+        </p:nvSpPr>
+        <p:spPr/>
+        <p:txBody>
+          <a:bodyPr/>
+          <a:lstStyle/>
+          <a:p>
+            <a:r>
+              <a:rPr lang="en-US" dirty="0"/>
+              <a:t>Predict DBS Share Price</a:t>
+            </a:r>
+            <a:endParaRPr lang="en-SG" dirty="0"/>
+          </a:p>
+        </p:txBody>
+      </p:sp>
+      <p:pic>
+        <p:nvPicPr>
+          <p:cNvPr id="6" name="Content Placeholder 5">
+            <a:extLst>
+              <a:ext uri="{FF2B5EF4-FFF2-40B4-BE49-F238E27FC236}">
+                <a16:creationId xmlns:a16="http://schemas.microsoft.com/office/drawing/2014/main" id="{FB2EB018-AE1E-63B7-8C86-D7F4700A9F4B}"/>
+              </a:ext>
+            </a:extLst>
+          </p:cNvPr>
+          <p:cNvPicPr>
+            <a:picLocks noGrp="1" noChangeAspect="1"/>
+          </p:cNvPicPr>
+          <p:nvPr>
+            <p:ph sz="half" idx="1"/>
+          </p:nvPr>
+        </p:nvPicPr>
+        <p:blipFill>
+          <a:blip r:embed="rId2"/>
+          <a:stretch>
+            <a:fillRect/>
+          </a:stretch>
+        </p:blipFill>
+        <p:spPr>
+          <a:xfrm>
+            <a:off x="1077102" y="2368536"/>
+            <a:ext cx="4648234" cy="3857653"/>
+          </a:xfrm>
+        </p:spPr>
+      </p:pic>
+      <p:pic>
+        <p:nvPicPr>
+          <p:cNvPr id="8" name="Content Placeholder 7">
+            <a:extLst>
+              <a:ext uri="{FF2B5EF4-FFF2-40B4-BE49-F238E27FC236}">
+                <a16:creationId xmlns:a16="http://schemas.microsoft.com/office/drawing/2014/main" id="{71F714B2-39B6-CC30-9530-D7C83177B900}"/>
+              </a:ext>
+            </a:extLst>
+          </p:cNvPr>
+          <p:cNvPicPr>
+            <a:picLocks noGrp="1" noChangeAspect="1"/>
+          </p:cNvPicPr>
+          <p:nvPr>
+            <p:ph sz="half" idx="2"/>
+          </p:nvPr>
+        </p:nvPicPr>
+        <p:blipFill>
+          <a:blip r:embed="rId3"/>
+          <a:stretch>
+            <a:fillRect/>
+          </a:stretch>
+        </p:blipFill>
+        <p:spPr>
+          <a:xfrm>
+            <a:off x="6038039" y="3073391"/>
+            <a:ext cx="4657759" cy="2447943"/>
+          </a:xfrm>
+        </p:spPr>
+      </p:pic>
+    </p:spTree>
+    <p:extLst>
+      <p:ext uri="{BB962C8B-B14F-4D97-AF65-F5344CB8AC3E}">
+        <p14:creationId xmlns:p14="http://schemas.microsoft.com/office/powerpoint/2010/main" val="2884575295"/>
+      </p:ext>
+    </p:extLst>
+  </p:cSld>
+  <p:clrMapOvr>
+    <a:masterClrMapping/>
+  </p:clrMapOvr>
+</p:sld>
+</file>
+
+<file path=ppt/slides/slide9.xml><?xml version="1.0" encoding="utf-8"?>
+<p:sld xmlns:a="http://schemas.openxmlformats.org/drawingml/2006/main" xmlns:r="http://schemas.openxmlformats.org/officeDocument/2006/relationships" xmlns:p="http://schemas.openxmlformats.org/presentationml/2006/main">
+  <p:cSld>
+    <p:spTree>
+      <p:nvGrpSpPr>
+        <p:cNvPr id="1" name=""/>
+        <p:cNvGrpSpPr/>
+        <p:nvPr/>
+      </p:nvGrpSpPr>
+      <p:grpSpPr>
+        <a:xfrm>
+          <a:off x="0" y="0"/>
+          <a:ext cx="0" cy="0"/>
+          <a:chOff x="0" y="0"/>
+          <a:chExt cx="0" cy="0"/>
+        </a:xfrm>
+      </p:grpSpPr>
+      <p:sp>
+        <p:nvSpPr>
+          <p:cNvPr id="2" name="Title 1">
+            <a:extLst>
+              <a:ext uri="{FF2B5EF4-FFF2-40B4-BE49-F238E27FC236}">
+                <a16:creationId xmlns:a16="http://schemas.microsoft.com/office/drawing/2014/main" id="{13AB3A9A-6EBF-66B6-47EB-D188066586B4}"/>
+              </a:ext>
+            </a:extLst>
+          </p:cNvPr>
+          <p:cNvSpPr>
+            <a:spLocks noGrp="1"/>
+          </p:cNvSpPr>
+          <p:nvPr>
+            <p:ph type="title"/>
+          </p:nvPr>
+        </p:nvSpPr>
+        <p:spPr/>
+        <p:txBody>
+          <a:bodyPr/>
+          <a:lstStyle/>
+          <a:p>
+            <a:r>
+              <a:rPr lang="en-US" dirty="0"/>
+              <a:t>Money Transfer</a:t>
+            </a:r>
+            <a:endParaRPr lang="en-SG" dirty="0"/>
+          </a:p>
+        </p:txBody>
+      </p:sp>
+      <p:pic>
+        <p:nvPicPr>
+          <p:cNvPr id="6" name="Content Placeholder 5">
+            <a:extLst>
+              <a:ext uri="{FF2B5EF4-FFF2-40B4-BE49-F238E27FC236}">
+                <a16:creationId xmlns:a16="http://schemas.microsoft.com/office/drawing/2014/main" id="{66036DD2-BEAF-7FC0-A8ED-8512276B838B}"/>
+              </a:ext>
+            </a:extLst>
+          </p:cNvPr>
+          <p:cNvPicPr>
+            <a:picLocks noGrp="1" noChangeAspect="1"/>
+          </p:cNvPicPr>
+          <p:nvPr>
+            <p:ph sz="half" idx="1"/>
+          </p:nvPr>
+        </p:nvPicPr>
+        <p:blipFill>
+          <a:blip r:embed="rId2"/>
+          <a:stretch>
+            <a:fillRect/>
+          </a:stretch>
+        </p:blipFill>
+        <p:spPr>
+          <a:xfrm>
+            <a:off x="1530730" y="2286000"/>
+            <a:ext cx="3740977" cy="4022725"/>
+          </a:xfrm>
+        </p:spPr>
+      </p:pic>
+      <p:pic>
+        <p:nvPicPr>
+          <p:cNvPr id="8" name="Content Placeholder 7">
+            <a:extLst>
+              <a:ext uri="{FF2B5EF4-FFF2-40B4-BE49-F238E27FC236}">
+                <a16:creationId xmlns:a16="http://schemas.microsoft.com/office/drawing/2014/main" id="{7597145E-F094-1633-7DF1-81553CB303A7}"/>
+              </a:ext>
+            </a:extLst>
+          </p:cNvPr>
+          <p:cNvPicPr>
+            <a:picLocks noGrp="1" noChangeAspect="1"/>
+          </p:cNvPicPr>
+          <p:nvPr>
+            <p:ph sz="half" idx="2"/>
+          </p:nvPr>
+        </p:nvPicPr>
+        <p:blipFill>
+          <a:blip r:embed="rId3"/>
+          <a:stretch>
+            <a:fillRect/>
+          </a:stretch>
+        </p:blipFill>
+        <p:spPr>
+          <a:xfrm>
+            <a:off x="6285691" y="2449499"/>
+            <a:ext cx="4162455" cy="3695727"/>
+          </a:xfrm>
+        </p:spPr>
+      </p:pic>
+    </p:spTree>
+    <p:extLst>
+      <p:ext uri="{BB962C8B-B14F-4D97-AF65-F5344CB8AC3E}">
+        <p14:creationId xmlns:p14="http://schemas.microsoft.com/office/powerpoint/2010/main" val="4141362416"/>
       </p:ext>
     </p:extLst>
   </p:cSld>

</xml_diff>